<commit_message>
061923 2024 Pre-Deployment v3
</commit_message>
<xml_diff>
--- a/LogIn_Template.pptx
+++ b/LogIn_Template.pptx
@@ -104,6 +104,11 @@
       </a:defRPr>
     </a:lvl9pPr>
   </p:defaultTextStyle>
+  <p:extLst>
+    <p:ext uri="{EFAFB233-063F-42B5-8137-9DF3F51BA10A}">
+      <p15:sldGuideLst xmlns:p15="http://schemas.microsoft.com/office/powerpoint/2012/main"/>
+    </p:ext>
+  </p:extLst>
 </p:presentation>
 </file>
 
@@ -256,7 +261,7 @@
           <a:p>
             <a:fld id="{361FF91A-C7D5-471A-99C7-BF6F88169938}" type="datetimeFigureOut">
               <a:rPr lang="en-PH" smtClean="0"/>
-              <a:t>7 May 2023</a:t>
+              <a:t>19 Jun 2023</a:t>
             </a:fld>
             <a:endParaRPr lang="en-PH"/>
           </a:p>
@@ -456,7 +461,7 @@
           <a:p>
             <a:fld id="{361FF91A-C7D5-471A-99C7-BF6F88169938}" type="datetimeFigureOut">
               <a:rPr lang="en-PH" smtClean="0"/>
-              <a:t>7 May 2023</a:t>
+              <a:t>19 Jun 2023</a:t>
             </a:fld>
             <a:endParaRPr lang="en-PH"/>
           </a:p>
@@ -666,7 +671,7 @@
           <a:p>
             <a:fld id="{361FF91A-C7D5-471A-99C7-BF6F88169938}" type="datetimeFigureOut">
               <a:rPr lang="en-PH" smtClean="0"/>
-              <a:t>7 May 2023</a:t>
+              <a:t>19 Jun 2023</a:t>
             </a:fld>
             <a:endParaRPr lang="en-PH"/>
           </a:p>
@@ -866,7 +871,7 @@
           <a:p>
             <a:fld id="{361FF91A-C7D5-471A-99C7-BF6F88169938}" type="datetimeFigureOut">
               <a:rPr lang="en-PH" smtClean="0"/>
-              <a:t>7 May 2023</a:t>
+              <a:t>19 Jun 2023</a:t>
             </a:fld>
             <a:endParaRPr lang="en-PH"/>
           </a:p>
@@ -1142,7 +1147,7 @@
           <a:p>
             <a:fld id="{361FF91A-C7D5-471A-99C7-BF6F88169938}" type="datetimeFigureOut">
               <a:rPr lang="en-PH" smtClean="0"/>
-              <a:t>7 May 2023</a:t>
+              <a:t>19 Jun 2023</a:t>
             </a:fld>
             <a:endParaRPr lang="en-PH"/>
           </a:p>
@@ -1410,7 +1415,7 @@
           <a:p>
             <a:fld id="{361FF91A-C7D5-471A-99C7-BF6F88169938}" type="datetimeFigureOut">
               <a:rPr lang="en-PH" smtClean="0"/>
-              <a:t>7 May 2023</a:t>
+              <a:t>19 Jun 2023</a:t>
             </a:fld>
             <a:endParaRPr lang="en-PH"/>
           </a:p>
@@ -1825,7 +1830,7 @@
           <a:p>
             <a:fld id="{361FF91A-C7D5-471A-99C7-BF6F88169938}" type="datetimeFigureOut">
               <a:rPr lang="en-PH" smtClean="0"/>
-              <a:t>7 May 2023</a:t>
+              <a:t>19 Jun 2023</a:t>
             </a:fld>
             <a:endParaRPr lang="en-PH"/>
           </a:p>
@@ -1967,7 +1972,7 @@
           <a:p>
             <a:fld id="{361FF91A-C7D5-471A-99C7-BF6F88169938}" type="datetimeFigureOut">
               <a:rPr lang="en-PH" smtClean="0"/>
-              <a:t>7 May 2023</a:t>
+              <a:t>19 Jun 2023</a:t>
             </a:fld>
             <a:endParaRPr lang="en-PH"/>
           </a:p>
@@ -2080,7 +2085,7 @@
           <a:p>
             <a:fld id="{361FF91A-C7D5-471A-99C7-BF6F88169938}" type="datetimeFigureOut">
               <a:rPr lang="en-PH" smtClean="0"/>
-              <a:t>7 May 2023</a:t>
+              <a:t>19 Jun 2023</a:t>
             </a:fld>
             <a:endParaRPr lang="en-PH"/>
           </a:p>
@@ -2393,7 +2398,7 @@
           <a:p>
             <a:fld id="{361FF91A-C7D5-471A-99C7-BF6F88169938}" type="datetimeFigureOut">
               <a:rPr lang="en-PH" smtClean="0"/>
-              <a:t>7 May 2023</a:t>
+              <a:t>19 Jun 2023</a:t>
             </a:fld>
             <a:endParaRPr lang="en-PH"/>
           </a:p>
@@ -2682,7 +2687,7 @@
           <a:p>
             <a:fld id="{361FF91A-C7D5-471A-99C7-BF6F88169938}" type="datetimeFigureOut">
               <a:rPr lang="en-PH" smtClean="0"/>
-              <a:t>7 May 2023</a:t>
+              <a:t>19 Jun 2023</a:t>
             </a:fld>
             <a:endParaRPr lang="en-PH"/>
           </a:p>
@@ -2925,7 +2930,7 @@
           <a:p>
             <a:fld id="{361FF91A-C7D5-471A-99C7-BF6F88169938}" type="datetimeFigureOut">
               <a:rPr lang="en-PH" smtClean="0"/>
-              <a:t>7 May 2023</a:t>
+              <a:t>19 Jun 2023</a:t>
             </a:fld>
             <a:endParaRPr lang="en-PH"/>
           </a:p>
@@ -3342,195 +3347,323 @@
           <a:chExt cx="0" cy="0"/>
         </a:xfrm>
       </p:grpSpPr>
-      <p:sp>
-        <p:nvSpPr>
-          <p:cNvPr id="6" name="Rectangle: Rounded Corners 5">
-            <a:extLst>
-              <a:ext uri="{FF2B5EF4-FFF2-40B4-BE49-F238E27FC236}">
-                <a16:creationId xmlns:a16="http://schemas.microsoft.com/office/drawing/2014/main" id="{752E0F3C-3625-E772-6341-FDAE7C6ED977}"/>
-              </a:ext>
-            </a:extLst>
-          </p:cNvPr>
-          <p:cNvSpPr/>
+      <p:grpSp>
+        <p:nvGrpSpPr>
+          <p:cNvPr id="4" name="Group 3">
+            <a:extLst>
+              <a:ext uri="{FF2B5EF4-FFF2-40B4-BE49-F238E27FC236}">
+                <a16:creationId xmlns:a16="http://schemas.microsoft.com/office/drawing/2014/main" id="{BD86A7B1-A943-7266-64CA-C02119B03BC9}"/>
+              </a:ext>
+            </a:extLst>
+          </p:cNvPr>
+          <p:cNvGrpSpPr/>
           <p:nvPr/>
-        </p:nvSpPr>
-        <p:spPr>
+        </p:nvGrpSpPr>
+        <p:grpSpPr>
           <a:xfrm>
             <a:off x="2262516" y="921249"/>
             <a:ext cx="7666967" cy="4539984"/>
+            <a:chOff x="2262516" y="921249"/>
+            <a:chExt cx="7666967" cy="4539984"/>
           </a:xfrm>
-          <a:prstGeom prst="roundRect">
-            <a:avLst>
-              <a:gd name="adj" fmla="val 3869"/>
-            </a:avLst>
-          </a:prstGeom>
-          <a:solidFill>
-            <a:srgbClr val="191919"/>
-          </a:solidFill>
-          <a:ln>
+        </p:grpSpPr>
+        <p:sp>
+          <p:nvSpPr>
+            <p:cNvPr id="6" name="Rectangle: Rounded Corners 5">
+              <a:extLst>
+                <a:ext uri="{FF2B5EF4-FFF2-40B4-BE49-F238E27FC236}">
+                  <a16:creationId xmlns:a16="http://schemas.microsoft.com/office/drawing/2014/main" id="{752E0F3C-3625-E772-6341-FDAE7C6ED977}"/>
+                </a:ext>
+              </a:extLst>
+            </p:cNvPr>
+            <p:cNvSpPr/>
+            <p:nvPr/>
+          </p:nvSpPr>
+          <p:spPr>
+            <a:xfrm>
+              <a:off x="2262516" y="921249"/>
+              <a:ext cx="7666967" cy="4539984"/>
+            </a:xfrm>
+            <a:prstGeom prst="roundRect">
+              <a:avLst>
+                <a:gd name="adj" fmla="val 3869"/>
+              </a:avLst>
+            </a:prstGeom>
             <a:solidFill>
               <a:srgbClr val="191919"/>
             </a:solidFill>
-          </a:ln>
-        </p:spPr>
-        <p:style>
-          <a:lnRef idx="2">
-            <a:schemeClr val="accent1">
-              <a:shade val="50000"/>
-            </a:schemeClr>
-          </a:lnRef>
-          <a:fillRef idx="1">
-            <a:schemeClr val="accent1"/>
-          </a:fillRef>
-          <a:effectRef idx="0">
-            <a:schemeClr val="accent1"/>
-          </a:effectRef>
-          <a:fontRef idx="minor">
-            <a:schemeClr val="lt1"/>
-          </a:fontRef>
-        </p:style>
-        <p:txBody>
-          <a:bodyPr rtlCol="0" anchor="ctr"/>
-          <a:lstStyle/>
-          <a:p>
-            <a:pPr algn="ctr"/>
-            <a:endParaRPr lang="en-PH"/>
-          </a:p>
-        </p:txBody>
-      </p:sp>
-      <p:pic>
-        <p:nvPicPr>
-          <p:cNvPr id="5" name="Picture 4" descr="Icon&#10;&#10;Description automatically generated">
-            <a:extLst>
-              <a:ext uri="{FF2B5EF4-FFF2-40B4-BE49-F238E27FC236}">
-                <a16:creationId xmlns:a16="http://schemas.microsoft.com/office/drawing/2014/main" id="{9E572298-5765-CC06-DADA-048918C17BD0}"/>
-              </a:ext>
-            </a:extLst>
-          </p:cNvPr>
-          <p:cNvPicPr>
-            <a:picLocks noChangeAspect="1"/>
-          </p:cNvPicPr>
-          <p:nvPr/>
-        </p:nvPicPr>
-        <p:blipFill>
-          <a:blip r:embed="rId2">
-            <a:extLst>
-              <a:ext uri="{BEBA8EAE-BF5A-486C-A8C5-ECC9F3942E4B}">
-                <a14:imgProps xmlns:a14="http://schemas.microsoft.com/office/drawing/2010/main">
-                  <a14:imgLayer r:embed="rId3">
-                    <a14:imgEffect>
-                      <a14:backgroundRemoval t="10000" b="90000" l="10000" r="90000">
-                        <a14:foregroundMark x1="25400" y1="48350" x2="25400" y2="48350"/>
-                        <a14:foregroundMark x1="22100" y1="36200" x2="23450" y2="53600"/>
-                        <a14:foregroundMark x1="20500" y1="65450" x2="26750" y2="52000"/>
-                        <a14:foregroundMark x1="73450" y1="60850" x2="74400" y2="44750"/>
-                        <a14:foregroundMark x1="70150" y1="66100" x2="76400" y2="53600"/>
-                      </a14:backgroundRemoval>
-                    </a14:imgEffect>
-                  </a14:imgLayer>
-                </a14:imgProps>
-              </a:ext>
-              <a:ext uri="{28A0092B-C50C-407E-A947-70E740481C1C}">
-                <a14:useLocalDpi xmlns:a14="http://schemas.microsoft.com/office/drawing/2010/main" val="0"/>
-              </a:ext>
-            </a:extLst>
-          </a:blip>
-          <a:stretch>
-            <a:fillRect/>
-          </a:stretch>
-        </p:blipFill>
-        <p:spPr>
-          <a:xfrm>
-            <a:off x="2296637" y="1924787"/>
-            <a:ext cx="2602534" cy="2602534"/>
-          </a:xfrm>
-          <a:prstGeom prst="rect">
-            <a:avLst/>
-          </a:prstGeom>
-        </p:spPr>
-      </p:pic>
-      <p:pic>
-        <p:nvPicPr>
-          <p:cNvPr id="9" name="Picture 8">
-            <a:extLst>
-              <a:ext uri="{FF2B5EF4-FFF2-40B4-BE49-F238E27FC236}">
-                <a16:creationId xmlns:a16="http://schemas.microsoft.com/office/drawing/2014/main" id="{AF257DBF-8AFB-4B56-30CE-7BFFB84C0823}"/>
-              </a:ext>
-            </a:extLst>
-          </p:cNvPr>
-          <p:cNvPicPr>
-            <a:picLocks noChangeAspect="1"/>
-          </p:cNvPicPr>
-          <p:nvPr/>
-        </p:nvPicPr>
-        <p:blipFill>
-          <a:blip r:embed="rId4">
-            <a:extLst>
-              <a:ext uri="{BEBA8EAE-BF5A-486C-A8C5-ECC9F3942E4B}">
-                <a14:imgProps xmlns:a14="http://schemas.microsoft.com/office/drawing/2010/main">
-                  <a14:imgLayer r:embed="rId5">
-                    <a14:imgEffect>
-                      <a14:backgroundRemoval t="10000" b="90000" l="10000" r="90000">
-                        <a14:foregroundMark x1="11111" y1="39665" x2="10943" y2="73184"/>
-                        <a14:foregroundMark x1="10943" y1="73184" x2="14983" y2="83240"/>
-                        <a14:foregroundMark x1="53199" y1="88827" x2="63131" y2="88268"/>
-                        <a14:foregroundMark x1="63131" y1="88268" x2="63468" y2="88268"/>
-                        <a14:foregroundMark x1="61616" y1="38547" x2="60943" y2="55866"/>
-                        <a14:foregroundMark x1="72054" y1="36313" x2="70370" y2="59777"/>
-                        <a14:foregroundMark x1="49832" y1="40782" x2="52020" y2="55866"/>
-                        <a14:foregroundMark x1="41414" y1="42458" x2="42761" y2="56983"/>
-                        <a14:foregroundMark x1="32660" y1="41341" x2="28788" y2="45251"/>
-                      </a14:backgroundRemoval>
-                    </a14:imgEffect>
-                  </a14:imgLayer>
-                </a14:imgProps>
-              </a:ext>
-            </a:extLst>
-          </a:blip>
-          <a:stretch>
-            <a:fillRect/>
-          </a:stretch>
-        </p:blipFill>
-        <p:spPr>
-          <a:xfrm>
-            <a:off x="4546832" y="2844296"/>
-            <a:ext cx="2248251" cy="677504"/>
-          </a:xfrm>
-          <a:prstGeom prst="rect">
-            <a:avLst/>
-          </a:prstGeom>
-        </p:spPr>
-      </p:pic>
-      <p:pic>
-        <p:nvPicPr>
-          <p:cNvPr id="11" name="Picture 10">
-            <a:extLst>
-              <a:ext uri="{FF2B5EF4-FFF2-40B4-BE49-F238E27FC236}">
-                <a16:creationId xmlns:a16="http://schemas.microsoft.com/office/drawing/2014/main" id="{567ECFC3-F889-ACF4-8937-68E349C61E9F}"/>
-              </a:ext>
-            </a:extLst>
-          </p:cNvPr>
-          <p:cNvPicPr>
-            <a:picLocks noChangeAspect="1"/>
-          </p:cNvPicPr>
-          <p:nvPr/>
-        </p:nvPicPr>
-        <p:blipFill>
-          <a:blip r:embed="rId6"/>
-          <a:stretch>
-            <a:fillRect/>
-          </a:stretch>
-        </p:blipFill>
-        <p:spPr>
-          <a:xfrm>
-            <a:off x="2544527" y="4659750"/>
-            <a:ext cx="4309279" cy="638034"/>
-          </a:xfrm>
-          <a:prstGeom prst="rect">
-            <a:avLst/>
-          </a:prstGeom>
-        </p:spPr>
-      </p:pic>
+            <a:ln>
+              <a:solidFill>
+                <a:srgbClr val="191919"/>
+              </a:solidFill>
+            </a:ln>
+          </p:spPr>
+          <p:style>
+            <a:lnRef idx="2">
+              <a:schemeClr val="accent1">
+                <a:shade val="50000"/>
+              </a:schemeClr>
+            </a:lnRef>
+            <a:fillRef idx="1">
+              <a:schemeClr val="accent1"/>
+            </a:fillRef>
+            <a:effectRef idx="0">
+              <a:schemeClr val="accent1"/>
+            </a:effectRef>
+            <a:fontRef idx="minor">
+              <a:schemeClr val="lt1"/>
+            </a:fontRef>
+          </p:style>
+          <p:txBody>
+            <a:bodyPr rtlCol="0" anchor="ctr"/>
+            <a:lstStyle/>
+            <a:p>
+              <a:pPr algn="ctr"/>
+              <a:endParaRPr lang="en-PH"/>
+            </a:p>
+          </p:txBody>
+        </p:sp>
+        <p:pic>
+          <p:nvPicPr>
+            <p:cNvPr id="5" name="Picture 4" descr="Icon&#10;&#10;Description automatically generated">
+              <a:extLst>
+                <a:ext uri="{FF2B5EF4-FFF2-40B4-BE49-F238E27FC236}">
+                  <a16:creationId xmlns:a16="http://schemas.microsoft.com/office/drawing/2014/main" id="{9E572298-5765-CC06-DADA-048918C17BD0}"/>
+                </a:ext>
+              </a:extLst>
+            </p:cNvPr>
+            <p:cNvPicPr>
+              <a:picLocks noChangeAspect="1"/>
+            </p:cNvPicPr>
+            <p:nvPr/>
+          </p:nvPicPr>
+          <p:blipFill>
+            <a:blip r:embed="rId2">
+              <a:extLst>
+                <a:ext uri="{BEBA8EAE-BF5A-486C-A8C5-ECC9F3942E4B}">
+                  <a14:imgProps xmlns:a14="http://schemas.microsoft.com/office/drawing/2010/main">
+                    <a14:imgLayer r:embed="rId3">
+                      <a14:imgEffect>
+                        <a14:backgroundRemoval t="10000" b="90000" l="10000" r="90000">
+                          <a14:foregroundMark x1="25400" y1="48350" x2="25400" y2="48350"/>
+                          <a14:foregroundMark x1="22100" y1="36200" x2="23450" y2="53600"/>
+                          <a14:foregroundMark x1="20500" y1="65450" x2="26750" y2="52000"/>
+                          <a14:foregroundMark x1="73450" y1="60850" x2="74400" y2="44750"/>
+                          <a14:foregroundMark x1="70150" y1="66100" x2="76400" y2="53600"/>
+                        </a14:backgroundRemoval>
+                      </a14:imgEffect>
+                    </a14:imgLayer>
+                  </a14:imgProps>
+                </a:ext>
+                <a:ext uri="{28A0092B-C50C-407E-A947-70E740481C1C}">
+                  <a14:useLocalDpi xmlns:a14="http://schemas.microsoft.com/office/drawing/2010/main" val="0"/>
+                </a:ext>
+              </a:extLst>
+            </a:blip>
+            <a:stretch>
+              <a:fillRect/>
+            </a:stretch>
+          </p:blipFill>
+          <p:spPr>
+            <a:xfrm>
+              <a:off x="2296637" y="1924787"/>
+              <a:ext cx="2602534" cy="2602534"/>
+            </a:xfrm>
+            <a:prstGeom prst="rect">
+              <a:avLst/>
+            </a:prstGeom>
+          </p:spPr>
+        </p:pic>
+        <p:pic>
+          <p:nvPicPr>
+            <p:cNvPr id="9" name="Picture 8">
+              <a:extLst>
+                <a:ext uri="{FF2B5EF4-FFF2-40B4-BE49-F238E27FC236}">
+                  <a16:creationId xmlns:a16="http://schemas.microsoft.com/office/drawing/2014/main" id="{AF257DBF-8AFB-4B56-30CE-7BFFB84C0823}"/>
+                </a:ext>
+              </a:extLst>
+            </p:cNvPr>
+            <p:cNvPicPr>
+              <a:picLocks noChangeAspect="1"/>
+            </p:cNvPicPr>
+            <p:nvPr/>
+          </p:nvPicPr>
+          <p:blipFill>
+            <a:blip r:embed="rId4">
+              <a:extLst>
+                <a:ext uri="{BEBA8EAE-BF5A-486C-A8C5-ECC9F3942E4B}">
+                  <a14:imgProps xmlns:a14="http://schemas.microsoft.com/office/drawing/2010/main">
+                    <a14:imgLayer r:embed="rId5">
+                      <a14:imgEffect>
+                        <a14:backgroundRemoval t="10000" b="90000" l="10000" r="90000">
+                          <a14:foregroundMark x1="11111" y1="39665" x2="10943" y2="73184"/>
+                          <a14:foregroundMark x1="10943" y1="73184" x2="14983" y2="83240"/>
+                          <a14:foregroundMark x1="53199" y1="88827" x2="63131" y2="88268"/>
+                          <a14:foregroundMark x1="63131" y1="88268" x2="63468" y2="88268"/>
+                          <a14:foregroundMark x1="61616" y1="38547" x2="60943" y2="55866"/>
+                          <a14:foregroundMark x1="72054" y1="36313" x2="70370" y2="59777"/>
+                          <a14:foregroundMark x1="49832" y1="40782" x2="52020" y2="55866"/>
+                          <a14:foregroundMark x1="41414" y1="42458" x2="42761" y2="56983"/>
+                          <a14:foregroundMark x1="32660" y1="41341" x2="28788" y2="45251"/>
+                        </a14:backgroundRemoval>
+                      </a14:imgEffect>
+                    </a14:imgLayer>
+                  </a14:imgProps>
+                </a:ext>
+              </a:extLst>
+            </a:blip>
+            <a:stretch>
+              <a:fillRect/>
+            </a:stretch>
+          </p:blipFill>
+          <p:spPr>
+            <a:xfrm>
+              <a:off x="4546832" y="2844296"/>
+              <a:ext cx="2248251" cy="677504"/>
+            </a:xfrm>
+            <a:prstGeom prst="rect">
+              <a:avLst/>
+            </a:prstGeom>
+          </p:spPr>
+        </p:pic>
+        <p:pic>
+          <p:nvPicPr>
+            <p:cNvPr id="11" name="Picture 10">
+              <a:extLst>
+                <a:ext uri="{FF2B5EF4-FFF2-40B4-BE49-F238E27FC236}">
+                  <a16:creationId xmlns:a16="http://schemas.microsoft.com/office/drawing/2014/main" id="{567ECFC3-F889-ACF4-8937-68E349C61E9F}"/>
+                </a:ext>
+              </a:extLst>
+            </p:cNvPr>
+            <p:cNvPicPr>
+              <a:picLocks noChangeAspect="1"/>
+            </p:cNvPicPr>
+            <p:nvPr/>
+          </p:nvPicPr>
+          <p:blipFill>
+            <a:blip r:embed="rId6"/>
+            <a:stretch>
+              <a:fillRect/>
+            </a:stretch>
+          </p:blipFill>
+          <p:spPr>
+            <a:xfrm>
+              <a:off x="2544527" y="4659750"/>
+              <a:ext cx="4309279" cy="638034"/>
+            </a:xfrm>
+            <a:prstGeom prst="rect">
+              <a:avLst/>
+            </a:prstGeom>
+          </p:spPr>
+        </p:pic>
+        <p:sp>
+          <p:nvSpPr>
+            <p:cNvPr id="2" name="TextBox 1">
+              <a:extLst>
+                <a:ext uri="{FF2B5EF4-FFF2-40B4-BE49-F238E27FC236}">
+                  <a16:creationId xmlns:a16="http://schemas.microsoft.com/office/drawing/2014/main" id="{F0A776C6-1061-C048-B96B-0D8D6751DD71}"/>
+                </a:ext>
+              </a:extLst>
+            </p:cNvPr>
+            <p:cNvSpPr txBox="1"/>
+            <p:nvPr/>
+          </p:nvSpPr>
+          <p:spPr>
+            <a:xfrm>
+              <a:off x="6937696" y="998290"/>
+              <a:ext cx="2869034" cy="661720"/>
+            </a:xfrm>
+            <a:prstGeom prst="rect">
+              <a:avLst/>
+            </a:prstGeom>
+            <a:noFill/>
+          </p:spPr>
+          <p:txBody>
+            <a:bodyPr wrap="square" rtlCol="0">
+              <a:spAutoFit/>
+            </a:bodyPr>
+            <a:lstStyle/>
+            <a:p>
+              <a:pPr algn="r"/>
+              <a:r>
+                <a:rPr lang="en-PH" sz="900" dirty="0">
+                  <a:solidFill>
+                    <a:schemeClr val="bg2">
+                      <a:lumMod val="50000"/>
+                    </a:schemeClr>
+                  </a:solidFill>
+                  <a:latin typeface="Product Sans" panose="020B0403030502040203" pitchFamily="34" charset="0"/>
+                </a:rPr>
+                <a:t>Developed and published by: LNMM </a:t>
+              </a:r>
+              <a:r>
+                <a:rPr lang="en-PH" sz="1100" dirty="0">
+                  <a:solidFill>
+                    <a:schemeClr val="bg2">
+                      <a:lumMod val="50000"/>
+                    </a:schemeClr>
+                  </a:solidFill>
+                  <a:latin typeface="Product Sans" panose="020B0403030502040203" pitchFamily="34" charset="0"/>
+                </a:rPr>
+                <a:t>© </a:t>
+              </a:r>
+              <a:r>
+                <a:rPr lang="en-PH" sz="900" dirty="0">
+                  <a:solidFill>
+                    <a:schemeClr val="bg2">
+                      <a:lumMod val="50000"/>
+                    </a:schemeClr>
+                  </a:solidFill>
+                  <a:latin typeface="Product Sans" panose="020B0403030502040203" pitchFamily="34" charset="0"/>
+                </a:rPr>
+                <a:t>2023. </a:t>
+              </a:r>
+            </a:p>
+            <a:p>
+              <a:pPr algn="r"/>
+              <a:r>
+                <a:rPr lang="en-PH" sz="900" dirty="0">
+                  <a:solidFill>
+                    <a:schemeClr val="bg2">
+                      <a:lumMod val="50000"/>
+                    </a:schemeClr>
+                  </a:solidFill>
+                  <a:latin typeface="Product Sans" panose="020B0403030502040203" pitchFamily="34" charset="0"/>
+                </a:rPr>
+                <a:t>All rights reserved.</a:t>
+              </a:r>
+            </a:p>
+            <a:p>
+              <a:pPr algn="r"/>
+              <a:r>
+                <a:rPr lang="en-PH" sz="900" dirty="0">
+                  <a:solidFill>
+                    <a:schemeClr val="bg2">
+                      <a:lumMod val="50000"/>
+                    </a:schemeClr>
+                  </a:solidFill>
+                  <a:latin typeface="Product Sans" panose="020B0403030502040203" pitchFamily="34" charset="0"/>
+                </a:rPr>
+                <a:t> </a:t>
+              </a:r>
+            </a:p>
+            <a:p>
+              <a:pPr algn="r"/>
+              <a:r>
+                <a:rPr lang="en-PH" sz="800" dirty="0">
+                  <a:solidFill>
+                    <a:schemeClr val="bg2">
+                      <a:lumMod val="50000"/>
+                    </a:schemeClr>
+                  </a:solidFill>
+                  <a:latin typeface="Product Sans" panose="020B0403030502040203" pitchFamily="34" charset="0"/>
+                </a:rPr>
+                <a:t>Icons and images used belongs to their respective sources.</a:t>
+              </a:r>
+            </a:p>
+          </p:txBody>
+        </p:sp>
+      </p:grpSp>
     </p:spTree>
     <p:extLst>
       <p:ext uri="{BB962C8B-B14F-4D97-AF65-F5344CB8AC3E}">

</xml_diff>